<commit_message>
Added treated/untreated subsets to lanl data/common/gen_guide_trees.R - fixed bug posters/CAHR 2016.pptx - 'final' version tex/blind-dating.tex - rewrote abstract                      - changed latency model units                      - added binomial test explanation                      - added note on treated patients w.r.t. the binomial test                      -changed table sig. figs.
</commit_message>
<xml_diff>
--- a/posters/CAHR 2016.pptx
+++ b/posters/CAHR 2016.pptx
@@ -192,7 +192,7 @@
           <a:p>
             <a:fld id="{9255E038-B418-6846-8762-220F5ED64695}" type="datetimeFigureOut">
               <a:rPr lang="en-US" smtClean="0"/>
-              <a:t>2016-04-28</a:t>
+              <a:t>2016-04-29</a:t>
             </a:fld>
             <a:endParaRPr lang="en-US"/>
           </a:p>
@@ -725,7 +725,7 @@
           <a:p>
             <a:fld id="{D10E5F71-CB03-4346-9BBA-E5D3823F93A7}" type="datetimeFigureOut">
               <a:rPr lang="en-US" smtClean="0"/>
-              <a:t>2016-04-28</a:t>
+              <a:t>2016-04-29</a:t>
             </a:fld>
             <a:endParaRPr lang="en-US"/>
           </a:p>
@@ -895,7 +895,7 @@
           <a:p>
             <a:fld id="{D10E5F71-CB03-4346-9BBA-E5D3823F93A7}" type="datetimeFigureOut">
               <a:rPr lang="en-US" smtClean="0"/>
-              <a:t>2016-04-28</a:t>
+              <a:t>2016-04-29</a:t>
             </a:fld>
             <a:endParaRPr lang="en-US"/>
           </a:p>
@@ -1075,7 +1075,7 @@
           <a:p>
             <a:fld id="{D10E5F71-CB03-4346-9BBA-E5D3823F93A7}" type="datetimeFigureOut">
               <a:rPr lang="en-US" smtClean="0"/>
-              <a:t>2016-04-28</a:t>
+              <a:t>2016-04-29</a:t>
             </a:fld>
             <a:endParaRPr lang="en-US"/>
           </a:p>
@@ -1245,7 +1245,7 @@
           <a:p>
             <a:fld id="{D10E5F71-CB03-4346-9BBA-E5D3823F93A7}" type="datetimeFigureOut">
               <a:rPr lang="en-US" smtClean="0"/>
-              <a:t>2016-04-28</a:t>
+              <a:t>2016-04-29</a:t>
             </a:fld>
             <a:endParaRPr lang="en-US"/>
           </a:p>
@@ -1491,7 +1491,7 @@
           <a:p>
             <a:fld id="{D10E5F71-CB03-4346-9BBA-E5D3823F93A7}" type="datetimeFigureOut">
               <a:rPr lang="en-US" smtClean="0"/>
-              <a:t>2016-04-28</a:t>
+              <a:t>2016-04-29</a:t>
             </a:fld>
             <a:endParaRPr lang="en-US"/>
           </a:p>
@@ -1779,7 +1779,7 @@
           <a:p>
             <a:fld id="{D10E5F71-CB03-4346-9BBA-E5D3823F93A7}" type="datetimeFigureOut">
               <a:rPr lang="en-US" smtClean="0"/>
-              <a:t>2016-04-28</a:t>
+              <a:t>2016-04-29</a:t>
             </a:fld>
             <a:endParaRPr lang="en-US"/>
           </a:p>
@@ -2206,7 +2206,7 @@
           <a:p>
             <a:fld id="{D10E5F71-CB03-4346-9BBA-E5D3823F93A7}" type="datetimeFigureOut">
               <a:rPr lang="en-US" smtClean="0"/>
-              <a:t>2016-04-28</a:t>
+              <a:t>2016-04-29</a:t>
             </a:fld>
             <a:endParaRPr lang="en-US"/>
           </a:p>
@@ -2324,7 +2324,7 @@
           <a:p>
             <a:fld id="{D10E5F71-CB03-4346-9BBA-E5D3823F93A7}" type="datetimeFigureOut">
               <a:rPr lang="en-US" smtClean="0"/>
-              <a:t>2016-04-28</a:t>
+              <a:t>2016-04-29</a:t>
             </a:fld>
             <a:endParaRPr lang="en-US"/>
           </a:p>
@@ -2419,7 +2419,7 @@
           <a:p>
             <a:fld id="{D10E5F71-CB03-4346-9BBA-E5D3823F93A7}" type="datetimeFigureOut">
               <a:rPr lang="en-US" smtClean="0"/>
-              <a:t>2016-04-28</a:t>
+              <a:t>2016-04-29</a:t>
             </a:fld>
             <a:endParaRPr lang="en-US"/>
           </a:p>
@@ -2696,7 +2696,7 @@
           <a:p>
             <a:fld id="{D10E5F71-CB03-4346-9BBA-E5D3823F93A7}" type="datetimeFigureOut">
               <a:rPr lang="en-US" smtClean="0"/>
-              <a:t>2016-04-28</a:t>
+              <a:t>2016-04-29</a:t>
             </a:fld>
             <a:endParaRPr lang="en-US"/>
           </a:p>
@@ -2949,7 +2949,7 @@
           <a:p>
             <a:fld id="{D10E5F71-CB03-4346-9BBA-E5D3823F93A7}" type="datetimeFigureOut">
               <a:rPr lang="en-US" smtClean="0"/>
-              <a:t>2016-04-28</a:t>
+              <a:t>2016-04-29</a:t>
             </a:fld>
             <a:endParaRPr lang="en-US"/>
           </a:p>
@@ -3162,7 +3162,7 @@
           <a:p>
             <a:fld id="{D10E5F71-CB03-4346-9BBA-E5D3823F93A7}" type="datetimeFigureOut">
               <a:rPr lang="en-US" smtClean="0"/>
-              <a:t>2016-04-28</a:t>
+              <a:t>2016-04-29</a:t>
             </a:fld>
             <a:endParaRPr lang="en-US"/>
           </a:p>
@@ -3764,17 +3764,37 @@
                 <a:latin typeface="Arial"/>
                 <a:cs typeface="Arial"/>
               </a:rPr>
-              <a:t>, Jeffrey B. Joy</a:t>
-            </a:r>
-            <a:r>
-              <a:rPr lang="en-US" sz="4800" b="1" baseline="30000" dirty="0">
+              <a:t>, Jeffrey B. </a:t>
+            </a:r>
+            <a:r>
+              <a:rPr lang="hu-HU" sz="4800" b="1" dirty="0" smtClean="0">
                 <a:solidFill>
                   <a:schemeClr val="bg1"/>
                 </a:solidFill>
                 <a:latin typeface="Arial"/>
                 <a:cs typeface="Arial"/>
               </a:rPr>
-              <a:t>2</a:t>
+              <a:t>Joy</a:t>
+            </a:r>
+            <a:r>
+              <a:rPr lang="en-US" sz="4800" b="1" baseline="30000" dirty="0" smtClean="0">
+                <a:solidFill>
+                  <a:schemeClr val="bg1"/>
+                </a:solidFill>
+                <a:latin typeface="Arial"/>
+                <a:cs typeface="Arial"/>
+              </a:rPr>
+              <a:t>2,3</a:t>
+            </a:r>
+            <a:r>
+              <a:rPr lang="hu-HU" sz="4800" b="1" dirty="0" smtClean="0">
+                <a:solidFill>
+                  <a:schemeClr val="bg1"/>
+                </a:solidFill>
+                <a:latin typeface="Arial"/>
+                <a:cs typeface="Arial"/>
+              </a:rPr>
+              <a:t>, </a:t>
             </a:r>
             <a:r>
               <a:rPr lang="hu-HU" sz="4800" b="1" dirty="0">
@@ -3784,7 +3804,7 @@
                 <a:latin typeface="Arial"/>
                 <a:cs typeface="Arial"/>
               </a:rPr>
-              <a:t>, Zabrina L. Brumme</a:t>
+              <a:t>Zabrina L. Brumme</a:t>
             </a:r>
             <a:r>
               <a:rPr lang="en-US" sz="4800" b="1" baseline="30000" dirty="0">
@@ -4175,14 +4195,7 @@
                   <a:latin typeface="Arial"/>
                   <a:cs typeface="Arial"/>
                 </a:rPr>
-                <a:t>clock.</a:t>
-              </a:r>
-              <a:r>
-                <a:rPr lang="en-US" sz="3400" dirty="0" smtClean="0">
-                  <a:latin typeface="Arial"/>
-                  <a:cs typeface="Arial"/>
-                </a:rPr>
-                <a:t> </a:t>
+                <a:t>clock. </a:t>
               </a:r>
               <a:r>
                 <a:rPr lang="en-US" sz="3400" dirty="0">
@@ -4652,14 +4665,7 @@
                       <a:latin typeface="Arial"/>
                       <a:cs typeface="Arial"/>
                     </a:rPr>
-                    <a:t>We </a:t>
-                  </a:r>
-                  <a:r>
-                    <a:rPr lang="en-US" sz="3400" dirty="0" smtClean="0">
-                      <a:latin typeface="Arial"/>
-                      <a:cs typeface="Arial"/>
-                    </a:rPr>
-                    <a:t>collected published </a:t>
+                    <a:t>We collected published </a:t>
                   </a:r>
                   <a:r>
                     <a:rPr lang="en-US" sz="3400" dirty="0">
@@ -5392,14 +5398,7 @@
                   <a:latin typeface="Arial"/>
                   <a:cs typeface="Arial"/>
                 </a:rPr>
-                <a:t>This phylogeny represents the ancestral relationships between these HIV sequences in that host, and thus can be used to calculate a host-specific rate of HIV evolution. </a:t>
-              </a:r>
-              <a:r>
-                <a:rPr lang="en-US" sz="3400" dirty="0" smtClean="0">
-                  <a:latin typeface="Arial"/>
-                  <a:cs typeface="Arial"/>
-                </a:rPr>
-                <a:t>A</a:t>
+                <a:t>This phylogeny represents the ancestral relationships between these HIV sequences in that host, and thus can be used to calculate a host-specific rate of HIV evolution. A</a:t>
               </a:r>
               <a:r>
                 <a:rPr lang="en-US" sz="3400" dirty="0">
@@ -5429,10 +5428,6 @@
                 </a:rPr>
                 <a:t>sequence.</a:t>
               </a:r>
-              <a:endParaRPr lang="en-US" sz="3400" dirty="0" smtClean="0">
-                <a:latin typeface="Arial"/>
-                <a:cs typeface="Arial"/>
-              </a:endParaRPr>
             </a:p>
           </p:txBody>
         </p:sp>
@@ -5464,21 +5459,7 @@
                 <a:latin typeface="Arial"/>
                 <a:cs typeface="Arial"/>
               </a:rPr>
-              <a:t>Figure 1: </a:t>
-            </a:r>
-            <a:r>
-              <a:rPr lang="en-US" sz="3200" b="1" dirty="0" smtClean="0">
-                <a:latin typeface="Arial"/>
-                <a:cs typeface="Arial"/>
-              </a:rPr>
-              <a:t>Reconstructing the time that a lineage became </a:t>
-            </a:r>
-            <a:r>
-              <a:rPr lang="en-US" sz="3200" b="1" dirty="0" smtClean="0">
-                <a:latin typeface="Arial"/>
-                <a:cs typeface="Arial"/>
-              </a:rPr>
-              <a:t>latent. </a:t>
+              <a:t>Figure 1: Reconstructing the time that a lineage became latent. </a:t>
             </a:r>
             <a:r>
               <a:rPr lang="en-US" sz="3200" dirty="0" smtClean="0">
@@ -5597,21 +5578,7 @@
                 <a:latin typeface="Arial"/>
                 <a:cs typeface="Arial"/>
               </a:rPr>
-              <a:t>. Since, while latent, this lineage </a:t>
-            </a:r>
-            <a:r>
-              <a:rPr lang="en-US" sz="3200" dirty="0" smtClean="0">
-                <a:latin typeface="Arial"/>
-                <a:cs typeface="Arial"/>
-              </a:rPr>
-              <a:t>underwent negligible molecular evolution, </a:t>
-            </a:r>
-            <a:r>
-              <a:rPr lang="en-US" sz="3200" dirty="0" smtClean="0">
-                <a:latin typeface="Arial"/>
-                <a:cs typeface="Arial"/>
-              </a:rPr>
-              <a:t>the </a:t>
+              <a:t>. Since, while latent, this lineage underwent negligible molecular evolution, the </a:t>
             </a:r>
             <a:r>
               <a:rPr lang="en-US" sz="3200" dirty="0">
@@ -5625,14 +5592,7 @@
                 <a:latin typeface="Arial"/>
                 <a:cs typeface="Arial"/>
               </a:rPr>
-              <a:t>sequence </a:t>
-            </a:r>
-            <a:r>
-              <a:rPr lang="en-US" sz="3200" dirty="0" smtClean="0">
-                <a:latin typeface="Arial"/>
-                <a:cs typeface="Arial"/>
-              </a:rPr>
-              <a:t>(red </a:t>
+              <a:t>sequence (red </a:t>
             </a:r>
             <a:r>
               <a:rPr lang="en-US" sz="3200" dirty="0">
@@ -7169,14 +7129,7 @@
                         <a:latin typeface="Arial"/>
                         <a:cs typeface="Arial"/>
                       </a:rPr>
-                      <a:t>sequences. </a:t>
-                    </a:r>
-                    <a:r>
-                      <a:rPr lang="en-US" sz="3400" dirty="0" smtClean="0">
-                        <a:latin typeface="Arial"/>
-                        <a:cs typeface="Arial"/>
-                      </a:rPr>
-                      <a:t>As expected, the </a:t>
+                      <a:t>sequences. As expected, the </a:t>
                     </a:r>
                     <a:r>
                       <a:rPr lang="en-US" sz="3400" dirty="0">
@@ -7190,21 +7143,7 @@
                         <a:latin typeface="Arial"/>
                         <a:cs typeface="Arial"/>
                       </a:rPr>
-                      <a:t>was insignificant latency in the RNA sequences (p</a:t>
-                    </a:r>
-                    <a:r>
-                      <a:rPr lang="en-US" sz="3400" dirty="0" smtClean="0">
-                        <a:latin typeface="Arial"/>
-                        <a:cs typeface="Arial"/>
-                      </a:rPr>
-                      <a:t>=0.91) </a:t>
-                    </a:r>
-                    <a:r>
-                      <a:rPr lang="en-US" sz="3400" dirty="0" smtClean="0">
-                        <a:latin typeface="Arial"/>
-                        <a:cs typeface="Arial"/>
-                      </a:rPr>
-                      <a:t>and significant latency in </a:t>
+                      <a:t>was insignificant latency in the RNA sequences (p=0.91) and significant latency in </a:t>
                     </a:r>
                     <a:r>
                       <a:rPr lang="en-US" sz="3400" dirty="0">
@@ -7359,14 +7298,7 @@
                         <a:latin typeface="Arial"/>
                         <a:cs typeface="Arial"/>
                       </a:rPr>
-                      <a:t>Figure 2a: Simulated </a:t>
-                    </a:r>
-                    <a:r>
-                      <a:rPr lang="en-US" sz="3200" b="1" dirty="0" smtClean="0">
-                        <a:latin typeface="Arial"/>
-                        <a:cs typeface="Arial"/>
-                      </a:rPr>
-                      <a:t>data without latency</a:t>
+                      <a:t>Figure 2a: Simulated data without latency</a:t>
                     </a:r>
                     <a:endParaRPr lang="en-US" sz="3200" b="1" dirty="0">
                       <a:latin typeface="Arial"/>
@@ -7457,14 +7389,7 @@
                       <a:latin typeface="Arial"/>
                       <a:cs typeface="Arial"/>
                     </a:rPr>
-                    <a:t>We compared the normalized difference of the censored dates / predicted dates in our real data and simulated data. We found that the normalized difference fit reasonably well, but there was more dispersion in the real data. This is shown in </a:t>
-                  </a:r>
-                  <a:r>
-                    <a:rPr lang="en-US" sz="3400" dirty="0" smtClean="0">
-                      <a:latin typeface="Arial"/>
-                      <a:cs typeface="Arial"/>
-                    </a:rPr>
-                    <a:t>Figure 4 below. </a:t>
+                    <a:t>We compared the normalized difference of the censored dates / predicted dates in our real data and simulated data. We found that the normalized difference fit reasonably well, but there was more dispersion in the real data. This is shown in Figure 4 below. </a:t>
                   </a:r>
                   <a:endParaRPr lang="en-US" sz="3400" dirty="0">
                     <a:latin typeface="Arial"/>

</xml_diff>